<commit_message>
Add new chapters, and fix one TPM challenge
</commit_message>
<xml_diff>
--- a/hardware-computing/slides/Hardware Security.pptx
+++ b/hardware-computing/slides/Hardware Security.pptx
@@ -20,6 +20,9 @@
     <p:sldId id="265" r:id="rId15"/>
     <p:sldId id="266" r:id="rId16"/>
     <p:sldId id="267" r:id="rId17"/>
+    <p:sldId id="268" r:id="rId18"/>
+    <p:sldId id="269" r:id="rId19"/>
+    <p:sldId id="270" r:id="rId20"/>
   </p:sldIdLst>
   <p:sldSz cy="5143500" cx="9144000"/>
   <p:notesSz cx="6858000" cy="9144000"/>
@@ -801,7 +804,7 @@
   <p:cSld>
     <p:spTree>
       <p:nvGrpSpPr>
-        <p:cNvPr id="106" name="Shape 106"/>
+        <p:cNvPr id="107" name="Shape 107"/>
         <p:cNvGrpSpPr/>
         <p:nvPr/>
       </p:nvGrpSpPr>
@@ -815,7 +818,7 @@
       </p:grpSpPr>
       <p:sp>
         <p:nvSpPr>
-          <p:cNvPr id="107" name="Google Shape;107;g13b07ecc8de_0_43:notes"/>
+          <p:cNvPr id="108" name="Google Shape;108;g13b07ecc8de_0_23:notes"/>
           <p:cNvSpPr/>
           <p:nvPr>
             <p:ph idx="2" type="sldImg"/>
@@ -850,7 +853,7 @@
       </p:sp>
       <p:sp>
         <p:nvSpPr>
-          <p:cNvPr id="108" name="Google Shape;108;g13b07ecc8de_0_43:notes"/>
+          <p:cNvPr id="109" name="Google Shape;109;g13b07ecc8de_0_23:notes"/>
           <p:cNvSpPr txBox="1"/>
           <p:nvPr>
             <p:ph idx="1" type="body"/>
@@ -914,7 +917,7 @@
       </p:grpSpPr>
       <p:sp>
         <p:nvSpPr>
-          <p:cNvPr id="114" name="Google Shape;114;g13b07ecc8de_0_49:notes"/>
+          <p:cNvPr id="114" name="Google Shape;114;g13b07ecc8de_0_28:notes"/>
           <p:cNvSpPr/>
           <p:nvPr>
             <p:ph idx="2" type="sldImg"/>
@@ -949,7 +952,7 @@
       </p:sp>
       <p:sp>
         <p:nvSpPr>
-          <p:cNvPr id="115" name="Google Shape;115;g13b07ecc8de_0_49:notes"/>
+          <p:cNvPr id="115" name="Google Shape;115;g13b07ecc8de_0_28:notes"/>
           <p:cNvSpPr txBox="1"/>
           <p:nvPr>
             <p:ph idx="1" type="body"/>
@@ -1013,7 +1016,7 @@
       </p:grpSpPr>
       <p:sp>
         <p:nvSpPr>
-          <p:cNvPr id="120" name="Google Shape;120;g13b07ecc8de_0_54:notes"/>
+          <p:cNvPr id="120" name="Google Shape;120;g13b07ecc8de_0_38:notes"/>
           <p:cNvSpPr/>
           <p:nvPr>
             <p:ph idx="2" type="sldImg"/>
@@ -1048,7 +1051,304 @@
       </p:sp>
       <p:sp>
         <p:nvSpPr>
-          <p:cNvPr id="121" name="Google Shape;121;g13b07ecc8de_0_54:notes"/>
+          <p:cNvPr id="121" name="Google Shape;121;g13b07ecc8de_0_38:notes"/>
+          <p:cNvSpPr txBox="1"/>
+          <p:nvPr>
+            <p:ph idx="1" type="body"/>
+          </p:nvPr>
+        </p:nvSpPr>
+        <p:spPr>
+          <a:xfrm>
+            <a:off x="685800" y="4343400"/>
+            <a:ext cx="5486400" cy="4114800"/>
+          </a:xfrm>
+          <a:prstGeom prst="rect">
+            <a:avLst/>
+          </a:prstGeom>
+        </p:spPr>
+        <p:txBody>
+          <a:bodyPr anchorCtr="0" anchor="t" bIns="91425" lIns="91425" spcFirstLastPara="1" rIns="91425" wrap="square" tIns="91425">
+            <a:noAutofit/>
+          </a:bodyPr>
+          <a:lstStyle/>
+          <a:p>
+            <a:pPr indent="0" lvl="0" marL="0" rtl="0" algn="l">
+              <a:spcBef>
+                <a:spcPts val="0"/>
+              </a:spcBef>
+              <a:spcAft>
+                <a:spcPts val="0"/>
+              </a:spcAft>
+              <a:buNone/>
+            </a:pPr>
+            <a:r>
+              <a:t/>
+            </a:r>
+            <a:endParaRPr/>
+          </a:p>
+        </p:txBody>
+      </p:sp>
+    </p:spTree>
+  </p:cSld>
+  <p:clrMapOvr>
+    <a:masterClrMapping/>
+  </p:clrMapOvr>
+</p:notes>
+</file>
+
+<file path=ppt/notesSlides/notesSlide13.xml><?xml version="1.0" encoding="utf-8"?>
+<p:notes xmlns:a="http://schemas.openxmlformats.org/drawingml/2006/main" xmlns:r="http://schemas.openxmlformats.org/officeDocument/2006/relationships" xmlns:mc="http://schemas.openxmlformats.org/markup-compatibility/2006" xmlns:mv="urn:schemas-microsoft-com:mac:vml" xmlns:p="http://schemas.openxmlformats.org/presentationml/2006/main" xmlns:c="http://schemas.openxmlformats.org/drawingml/2006/chart" xmlns:dgm="http://schemas.openxmlformats.org/drawingml/2006/diagram" xmlns:o="urn:schemas-microsoft-com:office:office" xmlns:v="urn:schemas-microsoft-com:vml" xmlns:pvml="urn:schemas-microsoft-com:office:powerpoint" xmlns:com="http://schemas.openxmlformats.org/drawingml/2006/compatibility" xmlns:p14="http://schemas.microsoft.com/office/powerpoint/2010/main" xmlns:p15="http://schemas.microsoft.com/office/powerpoint/2012/main" xmlns:ahyp="http://schemas.microsoft.com/office/drawing/2018/hyperlinkcolor" showMasterPhAnim="0" showMasterSp="0">
+  <p:cSld>
+    <p:spTree>
+      <p:nvGrpSpPr>
+        <p:cNvPr id="125" name="Shape 125"/>
+        <p:cNvGrpSpPr/>
+        <p:nvPr/>
+      </p:nvGrpSpPr>
+      <p:grpSpPr>
+        <a:xfrm>
+          <a:off x="0" y="0"/>
+          <a:ext cx="0" cy="0"/>
+          <a:chOff x="0" y="0"/>
+          <a:chExt cx="0" cy="0"/>
+        </a:xfrm>
+      </p:grpSpPr>
+      <p:sp>
+        <p:nvSpPr>
+          <p:cNvPr id="126" name="Google Shape;126;g13b07ecc8de_0_43:notes"/>
+          <p:cNvSpPr/>
+          <p:nvPr>
+            <p:ph idx="2" type="sldImg"/>
+          </p:nvPr>
+        </p:nvSpPr>
+        <p:spPr>
+          <a:xfrm>
+            <a:off x="381300" y="685800"/>
+            <a:ext cx="6096000" cy="3429000"/>
+          </a:xfrm>
+          <a:custGeom>
+            <a:rect b="b" l="l" r="r" t="t"/>
+            <a:pathLst>
+              <a:path extrusionOk="0" h="120000" w="120000">
+                <a:moveTo>
+                  <a:pt x="0" y="0"/>
+                </a:moveTo>
+                <a:lnTo>
+                  <a:pt x="120000" y="0"/>
+                </a:lnTo>
+                <a:lnTo>
+                  <a:pt x="120000" y="120000"/>
+                </a:lnTo>
+                <a:lnTo>
+                  <a:pt x="0" y="120000"/>
+                </a:lnTo>
+                <a:close/>
+              </a:path>
+            </a:pathLst>
+          </a:custGeom>
+        </p:spPr>
+      </p:sp>
+      <p:sp>
+        <p:nvSpPr>
+          <p:cNvPr id="127" name="Google Shape;127;g13b07ecc8de_0_43:notes"/>
+          <p:cNvSpPr txBox="1"/>
+          <p:nvPr>
+            <p:ph idx="1" type="body"/>
+          </p:nvPr>
+        </p:nvSpPr>
+        <p:spPr>
+          <a:xfrm>
+            <a:off x="685800" y="4343400"/>
+            <a:ext cx="5486400" cy="4114800"/>
+          </a:xfrm>
+          <a:prstGeom prst="rect">
+            <a:avLst/>
+          </a:prstGeom>
+        </p:spPr>
+        <p:txBody>
+          <a:bodyPr anchorCtr="0" anchor="t" bIns="91425" lIns="91425" spcFirstLastPara="1" rIns="91425" wrap="square" tIns="91425">
+            <a:noAutofit/>
+          </a:bodyPr>
+          <a:lstStyle/>
+          <a:p>
+            <a:pPr indent="0" lvl="0" marL="0" rtl="0" algn="l">
+              <a:spcBef>
+                <a:spcPts val="0"/>
+              </a:spcBef>
+              <a:spcAft>
+                <a:spcPts val="0"/>
+              </a:spcAft>
+              <a:buNone/>
+            </a:pPr>
+            <a:r>
+              <a:t/>
+            </a:r>
+            <a:endParaRPr/>
+          </a:p>
+        </p:txBody>
+      </p:sp>
+    </p:spTree>
+  </p:cSld>
+  <p:clrMapOvr>
+    <a:masterClrMapping/>
+  </p:clrMapOvr>
+</p:notes>
+</file>
+
+<file path=ppt/notesSlides/notesSlide14.xml><?xml version="1.0" encoding="utf-8"?>
+<p:notes xmlns:a="http://schemas.openxmlformats.org/drawingml/2006/main" xmlns:r="http://schemas.openxmlformats.org/officeDocument/2006/relationships" xmlns:mc="http://schemas.openxmlformats.org/markup-compatibility/2006" xmlns:mv="urn:schemas-microsoft-com:mac:vml" xmlns:p="http://schemas.openxmlformats.org/presentationml/2006/main" xmlns:c="http://schemas.openxmlformats.org/drawingml/2006/chart" xmlns:dgm="http://schemas.openxmlformats.org/drawingml/2006/diagram" xmlns:o="urn:schemas-microsoft-com:office:office" xmlns:v="urn:schemas-microsoft-com:vml" xmlns:pvml="urn:schemas-microsoft-com:office:powerpoint" xmlns:com="http://schemas.openxmlformats.org/drawingml/2006/compatibility" xmlns:p14="http://schemas.microsoft.com/office/powerpoint/2010/main" xmlns:p15="http://schemas.microsoft.com/office/powerpoint/2012/main" xmlns:ahyp="http://schemas.microsoft.com/office/drawing/2018/hyperlinkcolor" showMasterPhAnim="0" showMasterSp="0">
+  <p:cSld>
+    <p:spTree>
+      <p:nvGrpSpPr>
+        <p:cNvPr id="132" name="Shape 132"/>
+        <p:cNvGrpSpPr/>
+        <p:nvPr/>
+      </p:nvGrpSpPr>
+      <p:grpSpPr>
+        <a:xfrm>
+          <a:off x="0" y="0"/>
+          <a:ext cx="0" cy="0"/>
+          <a:chOff x="0" y="0"/>
+          <a:chExt cx="0" cy="0"/>
+        </a:xfrm>
+      </p:grpSpPr>
+      <p:sp>
+        <p:nvSpPr>
+          <p:cNvPr id="133" name="Google Shape;133;g13b07ecc8de_0_49:notes"/>
+          <p:cNvSpPr/>
+          <p:nvPr>
+            <p:ph idx="2" type="sldImg"/>
+          </p:nvPr>
+        </p:nvSpPr>
+        <p:spPr>
+          <a:xfrm>
+            <a:off x="381300" y="685800"/>
+            <a:ext cx="6096000" cy="3429000"/>
+          </a:xfrm>
+          <a:custGeom>
+            <a:rect b="b" l="l" r="r" t="t"/>
+            <a:pathLst>
+              <a:path extrusionOk="0" h="120000" w="120000">
+                <a:moveTo>
+                  <a:pt x="0" y="0"/>
+                </a:moveTo>
+                <a:lnTo>
+                  <a:pt x="120000" y="0"/>
+                </a:lnTo>
+                <a:lnTo>
+                  <a:pt x="120000" y="120000"/>
+                </a:lnTo>
+                <a:lnTo>
+                  <a:pt x="0" y="120000"/>
+                </a:lnTo>
+                <a:close/>
+              </a:path>
+            </a:pathLst>
+          </a:custGeom>
+        </p:spPr>
+      </p:sp>
+      <p:sp>
+        <p:nvSpPr>
+          <p:cNvPr id="134" name="Google Shape;134;g13b07ecc8de_0_49:notes"/>
+          <p:cNvSpPr txBox="1"/>
+          <p:nvPr>
+            <p:ph idx="1" type="body"/>
+          </p:nvPr>
+        </p:nvSpPr>
+        <p:spPr>
+          <a:xfrm>
+            <a:off x="685800" y="4343400"/>
+            <a:ext cx="5486400" cy="4114800"/>
+          </a:xfrm>
+          <a:prstGeom prst="rect">
+            <a:avLst/>
+          </a:prstGeom>
+        </p:spPr>
+        <p:txBody>
+          <a:bodyPr anchorCtr="0" anchor="t" bIns="91425" lIns="91425" spcFirstLastPara="1" rIns="91425" wrap="square" tIns="91425">
+            <a:noAutofit/>
+          </a:bodyPr>
+          <a:lstStyle/>
+          <a:p>
+            <a:pPr indent="0" lvl="0" marL="0" rtl="0" algn="l">
+              <a:spcBef>
+                <a:spcPts val="0"/>
+              </a:spcBef>
+              <a:spcAft>
+                <a:spcPts val="0"/>
+              </a:spcAft>
+              <a:buNone/>
+            </a:pPr>
+            <a:r>
+              <a:t/>
+            </a:r>
+            <a:endParaRPr/>
+          </a:p>
+        </p:txBody>
+      </p:sp>
+    </p:spTree>
+  </p:cSld>
+  <p:clrMapOvr>
+    <a:masterClrMapping/>
+  </p:clrMapOvr>
+</p:notes>
+</file>
+
+<file path=ppt/notesSlides/notesSlide15.xml><?xml version="1.0" encoding="utf-8"?>
+<p:notes xmlns:a="http://schemas.openxmlformats.org/drawingml/2006/main" xmlns:r="http://schemas.openxmlformats.org/officeDocument/2006/relationships" xmlns:mc="http://schemas.openxmlformats.org/markup-compatibility/2006" xmlns:mv="urn:schemas-microsoft-com:mac:vml" xmlns:p="http://schemas.openxmlformats.org/presentationml/2006/main" xmlns:c="http://schemas.openxmlformats.org/drawingml/2006/chart" xmlns:dgm="http://schemas.openxmlformats.org/drawingml/2006/diagram" xmlns:o="urn:schemas-microsoft-com:office:office" xmlns:v="urn:schemas-microsoft-com:vml" xmlns:pvml="urn:schemas-microsoft-com:office:powerpoint" xmlns:com="http://schemas.openxmlformats.org/drawingml/2006/compatibility" xmlns:p14="http://schemas.microsoft.com/office/powerpoint/2010/main" xmlns:p15="http://schemas.microsoft.com/office/powerpoint/2012/main" xmlns:ahyp="http://schemas.microsoft.com/office/drawing/2018/hyperlinkcolor" showMasterPhAnim="0" showMasterSp="0">
+  <p:cSld>
+    <p:spTree>
+      <p:nvGrpSpPr>
+        <p:cNvPr id="138" name="Shape 138"/>
+        <p:cNvGrpSpPr/>
+        <p:nvPr/>
+      </p:nvGrpSpPr>
+      <p:grpSpPr>
+        <a:xfrm>
+          <a:off x="0" y="0"/>
+          <a:ext cx="0" cy="0"/>
+          <a:chOff x="0" y="0"/>
+          <a:chExt cx="0" cy="0"/>
+        </a:xfrm>
+      </p:grpSpPr>
+      <p:sp>
+        <p:nvSpPr>
+          <p:cNvPr id="139" name="Google Shape;139;g13b07ecc8de_0_54:notes"/>
+          <p:cNvSpPr/>
+          <p:nvPr>
+            <p:ph idx="2" type="sldImg"/>
+          </p:nvPr>
+        </p:nvSpPr>
+        <p:spPr>
+          <a:xfrm>
+            <a:off x="381300" y="685800"/>
+            <a:ext cx="6096000" cy="3429000"/>
+          </a:xfrm>
+          <a:custGeom>
+            <a:rect b="b" l="l" r="r" t="t"/>
+            <a:pathLst>
+              <a:path extrusionOk="0" h="120000" w="120000">
+                <a:moveTo>
+                  <a:pt x="0" y="0"/>
+                </a:moveTo>
+                <a:lnTo>
+                  <a:pt x="120000" y="0"/>
+                </a:lnTo>
+                <a:lnTo>
+                  <a:pt x="120000" y="120000"/>
+                </a:lnTo>
+                <a:lnTo>
+                  <a:pt x="0" y="120000"/>
+                </a:lnTo>
+                <a:close/>
+              </a:path>
+            </a:pathLst>
+          </a:custGeom>
+        </p:spPr>
+      </p:sp>
+      <p:sp>
+        <p:nvSpPr>
+          <p:cNvPr id="140" name="Google Shape;140;g13b07ecc8de_0_54:notes"/>
           <p:cNvSpPr txBox="1"/>
           <p:nvPr>
             <p:ph idx="1" type="body"/>
@@ -1607,7 +1907,7 @@
       </p:grpSpPr>
       <p:sp>
         <p:nvSpPr>
-          <p:cNvPr id="89" name="Google Shape;89;g13b07ecc8de_0_23:notes"/>
+          <p:cNvPr id="89" name="Google Shape;89;g25662f6c603_0_8:notes"/>
           <p:cNvSpPr/>
           <p:nvPr>
             <p:ph idx="2" type="sldImg"/>
@@ -1642,7 +1942,7 @@
       </p:sp>
       <p:sp>
         <p:nvSpPr>
-          <p:cNvPr id="90" name="Google Shape;90;g13b07ecc8de_0_23:notes"/>
+          <p:cNvPr id="90" name="Google Shape;90;g25662f6c603_0_8:notes"/>
           <p:cNvSpPr txBox="1"/>
           <p:nvPr>
             <p:ph idx="1" type="body"/>
@@ -1706,7 +2006,7 @@
       </p:grpSpPr>
       <p:sp>
         <p:nvSpPr>
-          <p:cNvPr id="95" name="Google Shape;95;g13b07ecc8de_0_28:notes"/>
+          <p:cNvPr id="95" name="Google Shape;95;g25662f6c603_0_14:notes"/>
           <p:cNvSpPr/>
           <p:nvPr>
             <p:ph idx="2" type="sldImg"/>
@@ -1741,7 +2041,7 @@
       </p:sp>
       <p:sp>
         <p:nvSpPr>
-          <p:cNvPr id="96" name="Google Shape;96;g13b07ecc8de_0_28:notes"/>
+          <p:cNvPr id="96" name="Google Shape;96;g25662f6c603_0_14:notes"/>
           <p:cNvSpPr txBox="1"/>
           <p:nvPr>
             <p:ph idx="1" type="body"/>
@@ -1805,7 +2105,7 @@
       </p:grpSpPr>
       <p:sp>
         <p:nvSpPr>
-          <p:cNvPr id="101" name="Google Shape;101;g13b07ecc8de_0_38:notes"/>
+          <p:cNvPr id="101" name="Google Shape;101;g25662f6c603_0_0:notes"/>
           <p:cNvSpPr/>
           <p:nvPr>
             <p:ph idx="2" type="sldImg"/>
@@ -1840,7 +2140,7 @@
       </p:sp>
       <p:sp>
         <p:nvSpPr>
-          <p:cNvPr id="102" name="Google Shape;102;g13b07ecc8de_0_38:notes"/>
+          <p:cNvPr id="102" name="Google Shape;102;g25662f6c603_0_0:notes"/>
           <p:cNvSpPr txBox="1"/>
           <p:nvPr>
             <p:ph idx="1" type="body"/>
@@ -6644,7 +6944,7 @@
   <p:cSld>
     <p:spTree>
       <p:nvGrpSpPr>
-        <p:cNvPr id="109" name="Shape 109"/>
+        <p:cNvPr id="110" name="Shape 110"/>
         <p:cNvGrpSpPr/>
         <p:nvPr/>
       </p:nvGrpSpPr>
@@ -6658,7 +6958,7 @@
       </p:grpSpPr>
       <p:sp>
         <p:nvSpPr>
-          <p:cNvPr id="110" name="Google Shape;110;p22"/>
+          <p:cNvPr id="111" name="Google Shape;111;p22"/>
           <p:cNvSpPr txBox="1"/>
           <p:nvPr>
             <p:ph type="title"/>
@@ -6690,7 +6990,7 @@
             </a:pPr>
             <a:r>
               <a:rPr lang="ro"/>
-              <a:t>CrossTalk - Theory Behind</a:t>
+              <a:t>Hardware Computing: Random Numbers</a:t>
             </a:r>
             <a:endParaRPr/>
           </a:p>
@@ -6698,7 +6998,7 @@
       </p:sp>
       <p:sp>
         <p:nvSpPr>
-          <p:cNvPr id="111" name="Google Shape;111;p22"/>
+          <p:cNvPr id="112" name="Google Shape;112;p22"/>
           <p:cNvSpPr txBox="1"/>
           <p:nvPr>
             <p:ph idx="1" type="body"/>
@@ -6707,7 +7007,7 @@
         <p:spPr>
           <a:xfrm>
             <a:off x="311700" y="1152475"/>
-            <a:ext cx="3728400" cy="3416400"/>
+            <a:ext cx="8520600" cy="3416400"/>
           </a:xfrm>
           <a:prstGeom prst="rect">
             <a:avLst/>
@@ -6731,7 +7031,7 @@
             </a:pPr>
             <a:r>
               <a:rPr lang="ro"/>
-              <a:t>one core can read information destined for another core</a:t>
+              <a:t>essential for all cryptographic operations</a:t>
             </a:r>
             <a:endParaRPr/>
           </a:p>
@@ -6748,7 +7048,7 @@
             </a:pPr>
             <a:r>
               <a:rPr lang="ro"/>
-              <a:t>data is stored in a buffer, before being sent to the core</a:t>
+              <a:t>true randomness can’t be achieved</a:t>
             </a:r>
             <a:endParaRPr/>
           </a:p>
@@ -6765,7 +7065,7 @@
             </a:pPr>
             <a:r>
               <a:rPr lang="ro"/>
-              <a:t>the buffer isn’t flushed before another core uses it</a:t>
+              <a:t>PRNG - pseudo-random number generator</a:t>
             </a:r>
             <a:endParaRPr/>
           </a:p>
@@ -6782,40 +7082,63 @@
             </a:pPr>
             <a:r>
               <a:rPr lang="ro"/>
-              <a:t>cpuid - known output, uses the buffer</a:t>
+              <a:t>entropy - the quantity of randomness in the system</a:t>
+            </a:r>
+            <a:endParaRPr/>
+          </a:p>
+          <a:p>
+            <a:pPr indent="-342900" lvl="0" marL="457200" rtl="0" algn="l">
+              <a:spcBef>
+                <a:spcPts val="0"/>
+              </a:spcBef>
+              <a:spcAft>
+                <a:spcPts val="0"/>
+              </a:spcAft>
+              <a:buSzPts val="1800"/>
+              <a:buChar char="●"/>
+            </a:pPr>
+            <a:r>
+              <a:rPr lang="ro"/>
+              <a:t>a normal user can’t generate reliable random numbers</a:t>
+            </a:r>
+            <a:endParaRPr/>
+          </a:p>
+          <a:p>
+            <a:pPr indent="-342900" lvl="0" marL="457200" rtl="0" algn="l">
+              <a:spcBef>
+                <a:spcPts val="0"/>
+              </a:spcBef>
+              <a:spcAft>
+                <a:spcPts val="0"/>
+              </a:spcAft>
+              <a:buSzPts val="1800"/>
+              <a:buChar char="●"/>
+            </a:pPr>
+            <a:r>
+              <a:rPr lang="ro"/>
+              <a:t>must rely on OS or hardware</a:t>
+            </a:r>
+            <a:endParaRPr/>
+          </a:p>
+          <a:p>
+            <a:pPr indent="-342900" lvl="0" marL="457200" rtl="0" algn="l">
+              <a:spcBef>
+                <a:spcPts val="0"/>
+              </a:spcBef>
+              <a:spcAft>
+                <a:spcPts val="0"/>
+              </a:spcAft>
+              <a:buSzPts val="1800"/>
+              <a:buChar char="●"/>
+            </a:pPr>
+            <a:r>
+              <a:rPr lang="ro"/>
+              <a:t>OS: /dev/urandom</a:t>
             </a:r>
             <a:endParaRPr/>
           </a:p>
         </p:txBody>
       </p:sp>
-      <p:pic>
-        <p:nvPicPr>
-          <p:cNvPr id="112" name="Google Shape;112;p22"/>
-          <p:cNvPicPr preferRelativeResize="0"/>
-          <p:nvPr/>
-        </p:nvPicPr>
-        <p:blipFill>
-          <a:blip r:embed="rId3">
-            <a:alphaModFix/>
-          </a:blip>
-          <a:stretch>
-            <a:fillRect/>
-          </a:stretch>
-        </p:blipFill>
-        <p:spPr>
-          <a:xfrm>
-            <a:off x="4510340" y="1017722"/>
-            <a:ext cx="4321956" cy="3810050"/>
-          </a:xfrm>
-          <a:prstGeom prst="rect">
-            <a:avLst/>
-          </a:prstGeom>
-          <a:noFill/>
-          <a:ln>
-            <a:noFill/>
-          </a:ln>
-        </p:spPr>
-      </p:pic>
     </p:spTree>
   </p:cSld>
   <p:clrMapOvr>
@@ -6875,7 +7198,7 @@
             </a:pPr>
             <a:r>
               <a:rPr lang="ro"/>
-              <a:t>Trusted Computing</a:t>
+              <a:t>Intel RDRAND and RDSEED</a:t>
             </a:r>
             <a:endParaRPr/>
           </a:p>
@@ -6916,7 +7239,7 @@
             </a:pPr>
             <a:r>
               <a:rPr lang="ro"/>
-              <a:t>can we trust the machine (the hardware)?</a:t>
+              <a:t>used to read from Intel’s PRNG</a:t>
             </a:r>
             <a:endParaRPr/>
           </a:p>
@@ -6933,7 +7256,41 @@
             </a:pPr>
             <a:r>
               <a:rPr lang="ro"/>
-              <a:t>a protocol to ensure the system isn’t altered</a:t>
+              <a:t>rdrand vs rdseed</a:t>
+            </a:r>
+            <a:endParaRPr/>
+          </a:p>
+          <a:p>
+            <a:pPr indent="-317500" lvl="1" marL="914400" rtl="0" algn="l">
+              <a:spcBef>
+                <a:spcPts val="0"/>
+              </a:spcBef>
+              <a:spcAft>
+                <a:spcPts val="0"/>
+              </a:spcAft>
+              <a:buSzPts val="1400"/>
+              <a:buChar char="○"/>
+            </a:pPr>
+            <a:r>
+              <a:rPr lang="ro"/>
+              <a:t>rdrand should be faster</a:t>
+            </a:r>
+            <a:endParaRPr/>
+          </a:p>
+          <a:p>
+            <a:pPr indent="-317500" lvl="1" marL="914400" rtl="0" algn="l">
+              <a:spcBef>
+                <a:spcPts val="0"/>
+              </a:spcBef>
+              <a:spcAft>
+                <a:spcPts val="0"/>
+              </a:spcAft>
+              <a:buSzPts val="1400"/>
+              <a:buChar char="○"/>
+            </a:pPr>
+            <a:r>
+              <a:rPr lang="ro"/>
+              <a:t>rdseed should be impossible to predict - both are impossible to predict</a:t>
             </a:r>
             <a:endParaRPr/>
           </a:p>
@@ -6950,7 +7307,24 @@
             </a:pPr>
             <a:r>
               <a:rPr lang="ro"/>
-              <a:t>implementation: TPM</a:t>
+              <a:t>they can (could) be intercepted</a:t>
+            </a:r>
+            <a:endParaRPr/>
+          </a:p>
+          <a:p>
+            <a:pPr indent="-342900" lvl="0" marL="457200" rtl="0" algn="l">
+              <a:spcBef>
+                <a:spcPts val="0"/>
+              </a:spcBef>
+              <a:spcAft>
+                <a:spcPts val="0"/>
+              </a:spcAft>
+              <a:buSzPts val="1800"/>
+              <a:buChar char="●"/>
+            </a:pPr>
+            <a:r>
+              <a:rPr lang="ro"/>
+              <a:t>CrossTalk, ZombieLoad and Co</a:t>
             </a:r>
             <a:endParaRPr/>
           </a:p>
@@ -6965,7 +7339,7 @@
 </file>
 
 <file path=ppt/slides/slide12.xml><?xml version="1.0" encoding="utf-8"?>
-<p:sld xmlns:a="http://schemas.openxmlformats.org/drawingml/2006/main" xmlns:r="http://schemas.openxmlformats.org/officeDocument/2006/relationships" xmlns:mc="http://schemas.openxmlformats.org/markup-compatibility/2006" xmlns:mv="urn:schemas-microsoft-com:mac:vml" xmlns:p="http://schemas.openxmlformats.org/presentationml/2006/main" xmlns:c="http://schemas.openxmlformats.org/drawingml/2006/chart" xmlns:dgm="http://schemas.openxmlformats.org/drawingml/2006/diagram" xmlns:o="urn:schemas-microsoft-com:office:office" xmlns:v="urn:schemas-microsoft-com:vml" xmlns:pvml="urn:schemas-microsoft-com:office:powerpoint" xmlns:com="http://schemas.openxmlformats.org/drawingml/2006/compatibility" xmlns:p14="http://schemas.microsoft.com/office/powerpoint/2010/main" xmlns:p15="http://schemas.microsoft.com/office/powerpoint/2012/main" xmlns:ahyp="http://schemas.microsoft.com/office/drawing/2018/hyperlinkcolor">
+<p:sld xmlns:a="http://schemas.openxmlformats.org/drawingml/2006/main" xmlns:r="http://schemas.openxmlformats.org/officeDocument/2006/relationships" xmlns:mc="http://schemas.openxmlformats.org/markup-compatibility/2006" xmlns:mv="urn:schemas-microsoft-com:mac:vml" xmlns:p="http://schemas.openxmlformats.org/presentationml/2006/main" xmlns:c="http://schemas.openxmlformats.org/drawingml/2006/chart" xmlns:dgm="http://schemas.openxmlformats.org/drawingml/2006/diagram" xmlns:o="urn:schemas-microsoft-com:office:office" xmlns:v="urn:schemas-microsoft-com:vml" xmlns:pvml="urn:schemas-microsoft-com:office:powerpoint" xmlns:com="http://schemas.openxmlformats.org/drawingml/2006/compatibility" xmlns:p14="http://schemas.microsoft.com/office/powerpoint/2010/main" xmlns:p15="http://schemas.microsoft.com/office/powerpoint/2012/main" xmlns:ahyp="http://schemas.microsoft.com/office/drawing/2018/hyperlinkcolor" show="0">
   <p:cSld>
     <p:spTree>
       <p:nvGrpSpPr>
@@ -7015,7 +7389,7 @@
             </a:pPr>
             <a:r>
               <a:rPr lang="ro"/>
-              <a:t>Trusted Platform Module</a:t>
+              <a:t>CrossTalk - Overview</a:t>
             </a:r>
             <a:endParaRPr/>
           </a:p>
@@ -7056,7 +7430,506 @@
             </a:pPr>
             <a:r>
               <a:rPr lang="ro"/>
-              <a:t>a hardware chip or implemented in BIOS</a:t>
+              <a:t>cross-core staging buffer reading</a:t>
+            </a:r>
+            <a:endParaRPr/>
+          </a:p>
+          <a:p>
+            <a:pPr indent="-342900" lvl="0" marL="457200" rtl="0" algn="l">
+              <a:spcBef>
+                <a:spcPts val="0"/>
+              </a:spcBef>
+              <a:spcAft>
+                <a:spcPts val="0"/>
+              </a:spcAft>
+              <a:buSzPts val="1800"/>
+              <a:buChar char="●"/>
+            </a:pPr>
+            <a:r>
+              <a:rPr lang="ro"/>
+              <a:t>extremely hard to replicate</a:t>
+            </a:r>
+            <a:endParaRPr/>
+          </a:p>
+          <a:p>
+            <a:pPr indent="-342900" lvl="0" marL="457200" rtl="0" algn="l">
+              <a:spcBef>
+                <a:spcPts val="0"/>
+              </a:spcBef>
+              <a:spcAft>
+                <a:spcPts val="0"/>
+              </a:spcAft>
+              <a:buSzPts val="1800"/>
+              <a:buChar char="●"/>
+            </a:pPr>
+            <a:r>
+              <a:rPr lang="ro"/>
+              <a:t>not so destructive - you can read some random numbers from another core</a:t>
+            </a:r>
+            <a:endParaRPr/>
+          </a:p>
+          <a:p>
+            <a:pPr indent="-342900" lvl="0" marL="457200" rtl="0" algn="l">
+              <a:spcBef>
+                <a:spcPts val="0"/>
+              </a:spcBef>
+              <a:spcAft>
+                <a:spcPts val="0"/>
+              </a:spcAft>
+              <a:buSzPts val="1800"/>
+              <a:buChar char="●"/>
+            </a:pPr>
+            <a:r>
+              <a:rPr lang="ro"/>
+              <a:t>very bad for SGX enclaves</a:t>
+            </a:r>
+            <a:endParaRPr/>
+          </a:p>
+          <a:p>
+            <a:pPr indent="-342900" lvl="0" marL="457200" rtl="0" algn="l">
+              <a:spcBef>
+                <a:spcPts val="0"/>
+              </a:spcBef>
+              <a:spcAft>
+                <a:spcPts val="0"/>
+              </a:spcAft>
+              <a:buSzPts val="1800"/>
+              <a:buChar char="●"/>
+            </a:pPr>
+            <a:r>
+              <a:rPr lang="ro"/>
+              <a:t>mitigated by Intel</a:t>
+            </a:r>
+            <a:endParaRPr/>
+          </a:p>
+        </p:txBody>
+      </p:sp>
+    </p:spTree>
+  </p:cSld>
+  <p:clrMapOvr>
+    <a:masterClrMapping/>
+  </p:clrMapOvr>
+</p:sld>
+</file>
+
+<file path=ppt/slides/slide13.xml><?xml version="1.0" encoding="utf-8"?>
+<p:sld xmlns:a="http://schemas.openxmlformats.org/drawingml/2006/main" xmlns:r="http://schemas.openxmlformats.org/officeDocument/2006/relationships" xmlns:mc="http://schemas.openxmlformats.org/markup-compatibility/2006" xmlns:mv="urn:schemas-microsoft-com:mac:vml" xmlns:p="http://schemas.openxmlformats.org/presentationml/2006/main" xmlns:c="http://schemas.openxmlformats.org/drawingml/2006/chart" xmlns:dgm="http://schemas.openxmlformats.org/drawingml/2006/diagram" xmlns:o="urn:schemas-microsoft-com:office:office" xmlns:v="urn:schemas-microsoft-com:vml" xmlns:pvml="urn:schemas-microsoft-com:office:powerpoint" xmlns:com="http://schemas.openxmlformats.org/drawingml/2006/compatibility" xmlns:p14="http://schemas.microsoft.com/office/powerpoint/2010/main" xmlns:p15="http://schemas.microsoft.com/office/powerpoint/2012/main" xmlns:ahyp="http://schemas.microsoft.com/office/drawing/2018/hyperlinkcolor" show="0">
+  <p:cSld>
+    <p:spTree>
+      <p:nvGrpSpPr>
+        <p:cNvPr id="128" name="Shape 128"/>
+        <p:cNvGrpSpPr/>
+        <p:nvPr/>
+      </p:nvGrpSpPr>
+      <p:grpSpPr>
+        <a:xfrm>
+          <a:off x="0" y="0"/>
+          <a:ext cx="0" cy="0"/>
+          <a:chOff x="0" y="0"/>
+          <a:chExt cx="0" cy="0"/>
+        </a:xfrm>
+      </p:grpSpPr>
+      <p:sp>
+        <p:nvSpPr>
+          <p:cNvPr id="129" name="Google Shape;129;p25"/>
+          <p:cNvSpPr txBox="1"/>
+          <p:nvPr>
+            <p:ph type="title"/>
+          </p:nvPr>
+        </p:nvSpPr>
+        <p:spPr>
+          <a:xfrm>
+            <a:off x="311700" y="445025"/>
+            <a:ext cx="8520600" cy="572700"/>
+          </a:xfrm>
+          <a:prstGeom prst="rect">
+            <a:avLst/>
+          </a:prstGeom>
+        </p:spPr>
+        <p:txBody>
+          <a:bodyPr anchorCtr="0" anchor="t" bIns="91425" lIns="91425" spcFirstLastPara="1" rIns="91425" wrap="square" tIns="91425">
+            <a:normAutofit fontScale="90000"/>
+          </a:bodyPr>
+          <a:lstStyle/>
+          <a:p>
+            <a:pPr indent="0" lvl="0" marL="0" rtl="0" algn="l">
+              <a:spcBef>
+                <a:spcPts val="0"/>
+              </a:spcBef>
+              <a:spcAft>
+                <a:spcPts val="0"/>
+              </a:spcAft>
+              <a:buNone/>
+            </a:pPr>
+            <a:r>
+              <a:rPr lang="ro"/>
+              <a:t>CrossTalk - Theory Behind</a:t>
+            </a:r>
+            <a:endParaRPr/>
+          </a:p>
+        </p:txBody>
+      </p:sp>
+      <p:sp>
+        <p:nvSpPr>
+          <p:cNvPr id="130" name="Google Shape;130;p25"/>
+          <p:cNvSpPr txBox="1"/>
+          <p:nvPr>
+            <p:ph idx="1" type="body"/>
+          </p:nvPr>
+        </p:nvSpPr>
+        <p:spPr>
+          <a:xfrm>
+            <a:off x="311700" y="1152475"/>
+            <a:ext cx="3728400" cy="3416400"/>
+          </a:xfrm>
+          <a:prstGeom prst="rect">
+            <a:avLst/>
+          </a:prstGeom>
+        </p:spPr>
+        <p:txBody>
+          <a:bodyPr anchorCtr="0" anchor="t" bIns="91425" lIns="91425" spcFirstLastPara="1" rIns="91425" wrap="square" tIns="91425">
+            <a:normAutofit/>
+          </a:bodyPr>
+          <a:lstStyle/>
+          <a:p>
+            <a:pPr indent="-342900" lvl="0" marL="457200" rtl="0" algn="l">
+              <a:spcBef>
+                <a:spcPts val="0"/>
+              </a:spcBef>
+              <a:spcAft>
+                <a:spcPts val="0"/>
+              </a:spcAft>
+              <a:buSzPts val="1800"/>
+              <a:buChar char="●"/>
+            </a:pPr>
+            <a:r>
+              <a:rPr lang="ro"/>
+              <a:t>one core can read information destined for another core</a:t>
+            </a:r>
+            <a:endParaRPr/>
+          </a:p>
+          <a:p>
+            <a:pPr indent="-342900" lvl="0" marL="457200" rtl="0" algn="l">
+              <a:spcBef>
+                <a:spcPts val="0"/>
+              </a:spcBef>
+              <a:spcAft>
+                <a:spcPts val="0"/>
+              </a:spcAft>
+              <a:buSzPts val="1800"/>
+              <a:buChar char="●"/>
+            </a:pPr>
+            <a:r>
+              <a:rPr lang="ro"/>
+              <a:t>data is stored in a buffer, before being sent to the core</a:t>
+            </a:r>
+            <a:endParaRPr/>
+          </a:p>
+          <a:p>
+            <a:pPr indent="-342900" lvl="0" marL="457200" rtl="0" algn="l">
+              <a:spcBef>
+                <a:spcPts val="0"/>
+              </a:spcBef>
+              <a:spcAft>
+                <a:spcPts val="0"/>
+              </a:spcAft>
+              <a:buSzPts val="1800"/>
+              <a:buChar char="●"/>
+            </a:pPr>
+            <a:r>
+              <a:rPr lang="ro"/>
+              <a:t>the buffer isn’t flushed before another core uses it</a:t>
+            </a:r>
+            <a:endParaRPr/>
+          </a:p>
+          <a:p>
+            <a:pPr indent="-342900" lvl="0" marL="457200" rtl="0" algn="l">
+              <a:spcBef>
+                <a:spcPts val="0"/>
+              </a:spcBef>
+              <a:spcAft>
+                <a:spcPts val="0"/>
+              </a:spcAft>
+              <a:buSzPts val="1800"/>
+              <a:buChar char="●"/>
+            </a:pPr>
+            <a:r>
+              <a:rPr lang="ro"/>
+              <a:t>cpuid - known output, uses the buffer</a:t>
+            </a:r>
+            <a:endParaRPr/>
+          </a:p>
+        </p:txBody>
+      </p:sp>
+      <p:pic>
+        <p:nvPicPr>
+          <p:cNvPr id="131" name="Google Shape;131;p25"/>
+          <p:cNvPicPr preferRelativeResize="0"/>
+          <p:nvPr/>
+        </p:nvPicPr>
+        <p:blipFill>
+          <a:blip r:embed="rId3">
+            <a:alphaModFix/>
+          </a:blip>
+          <a:stretch>
+            <a:fillRect/>
+          </a:stretch>
+        </p:blipFill>
+        <p:spPr>
+          <a:xfrm>
+            <a:off x="4510340" y="1017722"/>
+            <a:ext cx="4321956" cy="3810050"/>
+          </a:xfrm>
+          <a:prstGeom prst="rect">
+            <a:avLst/>
+          </a:prstGeom>
+          <a:noFill/>
+          <a:ln>
+            <a:noFill/>
+          </a:ln>
+        </p:spPr>
+      </p:pic>
+    </p:spTree>
+  </p:cSld>
+  <p:clrMapOvr>
+    <a:masterClrMapping/>
+  </p:clrMapOvr>
+</p:sld>
+</file>
+
+<file path=ppt/slides/slide14.xml><?xml version="1.0" encoding="utf-8"?>
+<p:sld xmlns:a="http://schemas.openxmlformats.org/drawingml/2006/main" xmlns:r="http://schemas.openxmlformats.org/officeDocument/2006/relationships" xmlns:mc="http://schemas.openxmlformats.org/markup-compatibility/2006" xmlns:mv="urn:schemas-microsoft-com:mac:vml" xmlns:p="http://schemas.openxmlformats.org/presentationml/2006/main" xmlns:c="http://schemas.openxmlformats.org/drawingml/2006/chart" xmlns:dgm="http://schemas.openxmlformats.org/drawingml/2006/diagram" xmlns:o="urn:schemas-microsoft-com:office:office" xmlns:v="urn:schemas-microsoft-com:vml" xmlns:pvml="urn:schemas-microsoft-com:office:powerpoint" xmlns:com="http://schemas.openxmlformats.org/drawingml/2006/compatibility" xmlns:p14="http://schemas.microsoft.com/office/powerpoint/2010/main" xmlns:p15="http://schemas.microsoft.com/office/powerpoint/2012/main" xmlns:ahyp="http://schemas.microsoft.com/office/drawing/2018/hyperlinkcolor">
+  <p:cSld>
+    <p:spTree>
+      <p:nvGrpSpPr>
+        <p:cNvPr id="135" name="Shape 135"/>
+        <p:cNvGrpSpPr/>
+        <p:nvPr/>
+      </p:nvGrpSpPr>
+      <p:grpSpPr>
+        <a:xfrm>
+          <a:off x="0" y="0"/>
+          <a:ext cx="0" cy="0"/>
+          <a:chOff x="0" y="0"/>
+          <a:chExt cx="0" cy="0"/>
+        </a:xfrm>
+      </p:grpSpPr>
+      <p:sp>
+        <p:nvSpPr>
+          <p:cNvPr id="136" name="Google Shape;136;p26"/>
+          <p:cNvSpPr txBox="1"/>
+          <p:nvPr>
+            <p:ph type="title"/>
+          </p:nvPr>
+        </p:nvSpPr>
+        <p:spPr>
+          <a:xfrm>
+            <a:off x="311700" y="445025"/>
+            <a:ext cx="8520600" cy="572700"/>
+          </a:xfrm>
+          <a:prstGeom prst="rect">
+            <a:avLst/>
+          </a:prstGeom>
+        </p:spPr>
+        <p:txBody>
+          <a:bodyPr anchorCtr="0" anchor="t" bIns="91425" lIns="91425" spcFirstLastPara="1" rIns="91425" wrap="square" tIns="91425">
+            <a:normAutofit fontScale="90000"/>
+          </a:bodyPr>
+          <a:lstStyle/>
+          <a:p>
+            <a:pPr indent="0" lvl="0" marL="0" rtl="0" algn="l">
+              <a:spcBef>
+                <a:spcPts val="0"/>
+              </a:spcBef>
+              <a:spcAft>
+                <a:spcPts val="0"/>
+              </a:spcAft>
+              <a:buNone/>
+            </a:pPr>
+            <a:r>
+              <a:rPr lang="ro"/>
+              <a:t>Trusted Computing</a:t>
+            </a:r>
+            <a:endParaRPr/>
+          </a:p>
+        </p:txBody>
+      </p:sp>
+      <p:sp>
+        <p:nvSpPr>
+          <p:cNvPr id="137" name="Google Shape;137;p26"/>
+          <p:cNvSpPr txBox="1"/>
+          <p:nvPr>
+            <p:ph idx="1" type="body"/>
+          </p:nvPr>
+        </p:nvSpPr>
+        <p:spPr>
+          <a:xfrm>
+            <a:off x="311700" y="1152475"/>
+            <a:ext cx="8520600" cy="3416400"/>
+          </a:xfrm>
+          <a:prstGeom prst="rect">
+            <a:avLst/>
+          </a:prstGeom>
+        </p:spPr>
+        <p:txBody>
+          <a:bodyPr anchorCtr="0" anchor="t" bIns="91425" lIns="91425" spcFirstLastPara="1" rIns="91425" wrap="square" tIns="91425">
+            <a:normAutofit/>
+          </a:bodyPr>
+          <a:lstStyle/>
+          <a:p>
+            <a:pPr indent="-342900" lvl="0" marL="457200" rtl="0" algn="l">
+              <a:spcBef>
+                <a:spcPts val="0"/>
+              </a:spcBef>
+              <a:spcAft>
+                <a:spcPts val="0"/>
+              </a:spcAft>
+              <a:buSzPts val="1800"/>
+              <a:buChar char="●"/>
+            </a:pPr>
+            <a:r>
+              <a:rPr lang="ro"/>
+              <a:t>can we trust the machine (the hardware)?</a:t>
+            </a:r>
+            <a:endParaRPr/>
+          </a:p>
+          <a:p>
+            <a:pPr indent="-342900" lvl="0" marL="457200" rtl="0" algn="l">
+              <a:spcBef>
+                <a:spcPts val="0"/>
+              </a:spcBef>
+              <a:spcAft>
+                <a:spcPts val="0"/>
+              </a:spcAft>
+              <a:buSzPts val="1800"/>
+              <a:buChar char="●"/>
+            </a:pPr>
+            <a:r>
+              <a:rPr lang="ro"/>
+              <a:t>a protocol to ensure the system isn’t altered</a:t>
+            </a:r>
+            <a:endParaRPr/>
+          </a:p>
+          <a:p>
+            <a:pPr indent="-342900" lvl="0" marL="457200" rtl="0" algn="l">
+              <a:spcBef>
+                <a:spcPts val="0"/>
+              </a:spcBef>
+              <a:spcAft>
+                <a:spcPts val="0"/>
+              </a:spcAft>
+              <a:buSzPts val="1800"/>
+              <a:buChar char="●"/>
+            </a:pPr>
+            <a:r>
+              <a:rPr lang="ro"/>
+              <a:t>implementation: TPM</a:t>
+            </a:r>
+            <a:endParaRPr/>
+          </a:p>
+        </p:txBody>
+      </p:sp>
+    </p:spTree>
+  </p:cSld>
+  <p:clrMapOvr>
+    <a:masterClrMapping/>
+  </p:clrMapOvr>
+</p:sld>
+</file>
+
+<file path=ppt/slides/slide15.xml><?xml version="1.0" encoding="utf-8"?>
+<p:sld xmlns:a="http://schemas.openxmlformats.org/drawingml/2006/main" xmlns:r="http://schemas.openxmlformats.org/officeDocument/2006/relationships" xmlns:mc="http://schemas.openxmlformats.org/markup-compatibility/2006" xmlns:mv="urn:schemas-microsoft-com:mac:vml" xmlns:p="http://schemas.openxmlformats.org/presentationml/2006/main" xmlns:c="http://schemas.openxmlformats.org/drawingml/2006/chart" xmlns:dgm="http://schemas.openxmlformats.org/drawingml/2006/diagram" xmlns:o="urn:schemas-microsoft-com:office:office" xmlns:v="urn:schemas-microsoft-com:vml" xmlns:pvml="urn:schemas-microsoft-com:office:powerpoint" xmlns:com="http://schemas.openxmlformats.org/drawingml/2006/compatibility" xmlns:p14="http://schemas.microsoft.com/office/powerpoint/2010/main" xmlns:p15="http://schemas.microsoft.com/office/powerpoint/2012/main" xmlns:ahyp="http://schemas.microsoft.com/office/drawing/2018/hyperlinkcolor">
+  <p:cSld>
+    <p:spTree>
+      <p:nvGrpSpPr>
+        <p:cNvPr id="141" name="Shape 141"/>
+        <p:cNvGrpSpPr/>
+        <p:nvPr/>
+      </p:nvGrpSpPr>
+      <p:grpSpPr>
+        <a:xfrm>
+          <a:off x="0" y="0"/>
+          <a:ext cx="0" cy="0"/>
+          <a:chOff x="0" y="0"/>
+          <a:chExt cx="0" cy="0"/>
+        </a:xfrm>
+      </p:grpSpPr>
+      <p:sp>
+        <p:nvSpPr>
+          <p:cNvPr id="142" name="Google Shape;142;p27"/>
+          <p:cNvSpPr txBox="1"/>
+          <p:nvPr>
+            <p:ph type="title"/>
+          </p:nvPr>
+        </p:nvSpPr>
+        <p:spPr>
+          <a:xfrm>
+            <a:off x="311700" y="445025"/>
+            <a:ext cx="8520600" cy="572700"/>
+          </a:xfrm>
+          <a:prstGeom prst="rect">
+            <a:avLst/>
+          </a:prstGeom>
+        </p:spPr>
+        <p:txBody>
+          <a:bodyPr anchorCtr="0" anchor="t" bIns="91425" lIns="91425" spcFirstLastPara="1" rIns="91425" wrap="square" tIns="91425">
+            <a:normAutofit fontScale="90000"/>
+          </a:bodyPr>
+          <a:lstStyle/>
+          <a:p>
+            <a:pPr indent="0" lvl="0" marL="0" rtl="0" algn="l">
+              <a:spcBef>
+                <a:spcPts val="0"/>
+              </a:spcBef>
+              <a:spcAft>
+                <a:spcPts val="0"/>
+              </a:spcAft>
+              <a:buNone/>
+            </a:pPr>
+            <a:r>
+              <a:rPr lang="ro"/>
+              <a:t>Trusted Platform Module</a:t>
+            </a:r>
+            <a:endParaRPr/>
+          </a:p>
+        </p:txBody>
+      </p:sp>
+      <p:sp>
+        <p:nvSpPr>
+          <p:cNvPr id="143" name="Google Shape;143;p27"/>
+          <p:cNvSpPr txBox="1"/>
+          <p:nvPr>
+            <p:ph idx="1" type="body"/>
+          </p:nvPr>
+        </p:nvSpPr>
+        <p:spPr>
+          <a:xfrm>
+            <a:off x="311700" y="1152475"/>
+            <a:ext cx="8520600" cy="3416400"/>
+          </a:xfrm>
+          <a:prstGeom prst="rect">
+            <a:avLst/>
+          </a:prstGeom>
+        </p:spPr>
+        <p:txBody>
+          <a:bodyPr anchorCtr="0" anchor="t" bIns="91425" lIns="91425" spcFirstLastPara="1" rIns="91425" wrap="square" tIns="91425">
+            <a:normAutofit/>
+          </a:bodyPr>
+          <a:lstStyle/>
+          <a:p>
+            <a:pPr indent="-342900" lvl="0" marL="457200" rtl="0" algn="l">
+              <a:spcBef>
+                <a:spcPts val="0"/>
+              </a:spcBef>
+              <a:spcAft>
+                <a:spcPts val="0"/>
+              </a:spcAft>
+              <a:buSzPts val="1800"/>
+              <a:buChar char="●"/>
+            </a:pPr>
+            <a:r>
+              <a:rPr lang="ro"/>
+              <a:t>a hardware chip, implemented in BIOS or in the CPU</a:t>
             </a:r>
             <a:endParaRPr/>
           </a:p>
@@ -7149,7 +8022,7 @@
       </p:sp>
       <p:pic>
         <p:nvPicPr>
-          <p:cNvPr id="125" name="Google Shape;125;p24"/>
+          <p:cNvPr id="144" name="Google Shape;144;p27"/>
           <p:cNvPicPr preferRelativeResize="0"/>
           <p:nvPr/>
         </p:nvPicPr>
@@ -7262,40 +8135,6 @@
             <a:normAutofit/>
           </a:bodyPr>
           <a:lstStyle/>
-          <a:p>
-            <a:pPr indent="-342900" lvl="0" marL="457200" rtl="0" algn="l">
-              <a:spcBef>
-                <a:spcPts val="0"/>
-              </a:spcBef>
-              <a:spcAft>
-                <a:spcPts val="0"/>
-              </a:spcAft>
-              <a:buSzPts val="1800"/>
-              <a:buChar char="●"/>
-            </a:pPr>
-            <a:r>
-              <a:rPr lang="ro"/>
-              <a:t>first time</a:t>
-            </a:r>
-            <a:endParaRPr/>
-          </a:p>
-          <a:p>
-            <a:pPr indent="-342900" lvl="0" marL="457200" rtl="0" algn="l">
-              <a:spcBef>
-                <a:spcPts val="0"/>
-              </a:spcBef>
-              <a:spcAft>
-                <a:spcPts val="0"/>
-              </a:spcAft>
-              <a:buSzPts val="1800"/>
-              <a:buChar char="●"/>
-            </a:pPr>
-            <a:r>
-              <a:rPr lang="ro"/>
-              <a:t>not tested on anyone</a:t>
-            </a:r>
-            <a:endParaRPr/>
-          </a:p>
           <a:p>
             <a:pPr indent="-342900" lvl="0" marL="457200" rtl="0" algn="l">
               <a:spcBef>
@@ -7667,7 +8506,7 @@
             </a:pPr>
             <a:r>
               <a:rPr lang="ro"/>
-              <a:t>how can the hardware isolate resources; from users to VMs</a:t>
+              <a:t>how can the hardware isolate resources; between VMs, between kernel and user</a:t>
             </a:r>
             <a:endParaRPr/>
           </a:p>
@@ -7684,7 +8523,7 @@
             </a:pPr>
             <a:r>
               <a:rPr lang="ro"/>
-              <a:t>some attacks - those that can be replicated</a:t>
+              <a:t>some attacks - maybe </a:t>
             </a:r>
             <a:endParaRPr/>
           </a:p>
@@ -7749,7 +8588,7 @@
             </a:pPr>
             <a:r>
               <a:rPr lang="ro"/>
-              <a:t>Hardware Computing: Encryption and Decryption</a:t>
+              <a:t>Hardware Computing: Cryptography</a:t>
             </a:r>
             <a:endParaRPr/>
           </a:p>
@@ -7790,7 +8629,7 @@
             </a:pPr>
             <a:r>
               <a:rPr lang="ro"/>
-              <a:t>Intel, AMD: AES</a:t>
+              <a:t>word of the day: speed</a:t>
             </a:r>
             <a:endParaRPr/>
           </a:p>
@@ -7807,7 +8646,7 @@
             </a:pPr>
             <a:r>
               <a:rPr lang="ro"/>
-              <a:t>ARM: AES, SHA</a:t>
+              <a:t>Intel, AMD, ARM: AES, SHA</a:t>
             </a:r>
             <a:endParaRPr/>
           </a:p>
@@ -7825,6 +8664,27 @@
             <a:r>
               <a:rPr lang="ro"/>
               <a:t>Other implementations: RISC-V, PowerPC, IBM</a:t>
+            </a:r>
+            <a:endParaRPr/>
+          </a:p>
+          <a:p>
+            <a:pPr indent="-342900" lvl="0" marL="457200" rtl="0" algn="l">
+              <a:spcBef>
+                <a:spcPts val="0"/>
+              </a:spcBef>
+              <a:spcAft>
+                <a:spcPts val="0"/>
+              </a:spcAft>
+              <a:buSzPts val="1800"/>
+              <a:buChar char="●"/>
+            </a:pPr>
+            <a:r>
+              <a:rPr lang="ro"/>
+              <a:t>disadvantage</a:t>
+            </a:r>
+            <a:r>
+              <a:rPr lang="ro"/>
+              <a:t>: to use the hardware instructions, you must know the algorithm very well</a:t>
             </a:r>
             <a:endParaRPr/>
           </a:p>
@@ -8059,155 +8919,40 @@
             </a:pPr>
             <a:r>
               <a:rPr lang="ro"/>
-              <a:t>Hardware Computing: Random Numbers</a:t>
+              <a:t>Intel AES-NI</a:t>
             </a:r>
             <a:endParaRPr/>
           </a:p>
         </p:txBody>
       </p:sp>
-      <p:sp>
-        <p:nvSpPr>
+      <p:pic>
+        <p:nvPicPr>
           <p:cNvPr id="93" name="Google Shape;93;p19"/>
-          <p:cNvSpPr txBox="1"/>
-          <p:nvPr>
-            <p:ph idx="1" type="body"/>
-          </p:nvPr>
-        </p:nvSpPr>
-        <p:spPr>
-          <a:xfrm>
-            <a:off x="311700" y="1152475"/>
-            <a:ext cx="8520600" cy="3416400"/>
+          <p:cNvPicPr preferRelativeResize="0"/>
+          <p:nvPr/>
+        </p:nvPicPr>
+        <p:blipFill>
+          <a:blip r:embed="rId3">
+            <a:alphaModFix/>
+          </a:blip>
+          <a:stretch>
+            <a:fillRect/>
+          </a:stretch>
+        </p:blipFill>
+        <p:spPr>
+          <a:xfrm>
+            <a:off x="2412200" y="1232275"/>
+            <a:ext cx="4319600" cy="3239700"/>
           </a:xfrm>
           <a:prstGeom prst="rect">
             <a:avLst/>
           </a:prstGeom>
-        </p:spPr>
-        <p:txBody>
-          <a:bodyPr anchorCtr="0" anchor="t" bIns="91425" lIns="91425" spcFirstLastPara="1" rIns="91425" wrap="square" tIns="91425">
-            <a:normAutofit/>
-          </a:bodyPr>
-          <a:lstStyle/>
-          <a:p>
-            <a:pPr indent="-342900" lvl="0" marL="457200" rtl="0" algn="l">
-              <a:spcBef>
-                <a:spcPts val="0"/>
-              </a:spcBef>
-              <a:spcAft>
-                <a:spcPts val="0"/>
-              </a:spcAft>
-              <a:buSzPts val="1800"/>
-              <a:buChar char="●"/>
-            </a:pPr>
-            <a:r>
-              <a:rPr lang="ro"/>
-              <a:t>essential for all cryptographic operations</a:t>
-            </a:r>
-            <a:endParaRPr/>
-          </a:p>
-          <a:p>
-            <a:pPr indent="-342900" lvl="0" marL="457200" rtl="0" algn="l">
-              <a:spcBef>
-                <a:spcPts val="0"/>
-              </a:spcBef>
-              <a:spcAft>
-                <a:spcPts val="0"/>
-              </a:spcAft>
-              <a:buSzPts val="1800"/>
-              <a:buChar char="●"/>
-            </a:pPr>
-            <a:r>
-              <a:rPr lang="ro"/>
-              <a:t>true randomness can’t be achieved</a:t>
-            </a:r>
-            <a:endParaRPr/>
-          </a:p>
-          <a:p>
-            <a:pPr indent="-342900" lvl="0" marL="457200" rtl="0" algn="l">
-              <a:spcBef>
-                <a:spcPts val="0"/>
-              </a:spcBef>
-              <a:spcAft>
-                <a:spcPts val="0"/>
-              </a:spcAft>
-              <a:buSzPts val="1800"/>
-              <a:buChar char="●"/>
-            </a:pPr>
-            <a:r>
-              <a:rPr lang="ro"/>
-              <a:t>PRNG - pseudo-random number generator</a:t>
-            </a:r>
-            <a:endParaRPr/>
-          </a:p>
-          <a:p>
-            <a:pPr indent="-342900" lvl="0" marL="457200" rtl="0" algn="l">
-              <a:spcBef>
-                <a:spcPts val="0"/>
-              </a:spcBef>
-              <a:spcAft>
-                <a:spcPts val="0"/>
-              </a:spcAft>
-              <a:buSzPts val="1800"/>
-              <a:buChar char="●"/>
-            </a:pPr>
-            <a:r>
-              <a:rPr lang="ro"/>
-              <a:t>entropy - the quantity of randomness in the system</a:t>
-            </a:r>
-            <a:endParaRPr/>
-          </a:p>
-          <a:p>
-            <a:pPr indent="-342900" lvl="0" marL="457200" rtl="0" algn="l">
-              <a:spcBef>
-                <a:spcPts val="0"/>
-              </a:spcBef>
-              <a:spcAft>
-                <a:spcPts val="0"/>
-              </a:spcAft>
-              <a:buSzPts val="1800"/>
-              <a:buChar char="●"/>
-            </a:pPr>
-            <a:r>
-              <a:rPr lang="ro"/>
-              <a:t>a normal user can’t generate reliable random numbers</a:t>
-            </a:r>
-            <a:endParaRPr/>
-          </a:p>
-          <a:p>
-            <a:pPr indent="-342900" lvl="0" marL="457200" rtl="0" algn="l">
-              <a:spcBef>
-                <a:spcPts val="0"/>
-              </a:spcBef>
-              <a:spcAft>
-                <a:spcPts val="0"/>
-              </a:spcAft>
-              <a:buSzPts val="1800"/>
-              <a:buChar char="●"/>
-            </a:pPr>
-            <a:r>
-              <a:rPr lang="ro"/>
-              <a:t>must rely on OS or hardware</a:t>
-            </a:r>
-            <a:endParaRPr/>
-          </a:p>
-          <a:p>
-            <a:pPr indent="-342900" lvl="0" marL="457200" rtl="0" algn="l">
-              <a:spcBef>
-                <a:spcPts val="0"/>
-              </a:spcBef>
-              <a:spcAft>
-                <a:spcPts val="0"/>
-              </a:spcAft>
-              <a:buSzPts val="1800"/>
-              <a:buChar char="●"/>
-            </a:pPr>
-            <a:r>
-              <a:rPr lang="ro"/>
-              <a:t>OS: /dev/urandom</a:t>
-            </a:r>
-            <a:endParaRPr/>
-          </a:p>
-        </p:txBody>
-      </p:sp>
+          <a:noFill/>
+          <a:ln>
+            <a:noFill/>
+          </a:ln>
+        </p:spPr>
+      </p:pic>
     </p:spTree>
   </p:cSld>
   <p:clrMapOvr>
@@ -8267,7 +9012,7 @@
             </a:pPr>
             <a:r>
               <a:rPr lang="ro"/>
-              <a:t>Intel RDRAND and RDSEED</a:t>
+              <a:t>ARM Cryptographic Extension</a:t>
             </a:r>
             <a:endParaRPr/>
           </a:p>
@@ -8308,7 +9053,7 @@
             </a:pPr>
             <a:r>
               <a:rPr lang="ro"/>
-              <a:t>used to read from Intel’s PRNG</a:t>
+              <a:t>optional for CPU producers</a:t>
             </a:r>
             <a:endParaRPr/>
           </a:p>
@@ -8325,41 +9070,7 @@
             </a:pPr>
             <a:r>
               <a:rPr lang="ro"/>
-              <a:t>rdrand vs rdseed</a:t>
-            </a:r>
-            <a:endParaRPr/>
-          </a:p>
-          <a:p>
-            <a:pPr indent="-317500" lvl="1" marL="914400" rtl="0" algn="l">
-              <a:spcBef>
-                <a:spcPts val="0"/>
-              </a:spcBef>
-              <a:spcAft>
-                <a:spcPts val="0"/>
-              </a:spcAft>
-              <a:buSzPts val="1400"/>
-              <a:buChar char="○"/>
-            </a:pPr>
-            <a:r>
-              <a:rPr lang="ro"/>
-              <a:t>rdrand should be faster</a:t>
-            </a:r>
-            <a:endParaRPr/>
-          </a:p>
-          <a:p>
-            <a:pPr indent="-317500" lvl="1" marL="914400" rtl="0" algn="l">
-              <a:spcBef>
-                <a:spcPts val="0"/>
-              </a:spcBef>
-              <a:spcAft>
-                <a:spcPts val="0"/>
-              </a:spcAft>
-              <a:buSzPts val="1400"/>
-              <a:buChar char="○"/>
-            </a:pPr>
-            <a:r>
-              <a:rPr lang="ro"/>
-              <a:t>rdseed should be impossible to predict - both are impossible to predict</a:t>
+              <a:t>you must find a board that uses it</a:t>
             </a:r>
             <a:endParaRPr/>
           </a:p>
@@ -8376,24 +9087,7 @@
             </a:pPr>
             <a:r>
               <a:rPr lang="ro"/>
-              <a:t>they can (could) be intercepted</a:t>
-            </a:r>
-            <a:endParaRPr/>
-          </a:p>
-          <a:p>
-            <a:pPr indent="-342900" lvl="0" marL="457200" rtl="0" algn="l">
-              <a:spcBef>
-                <a:spcPts val="0"/>
-              </a:spcBef>
-              <a:spcAft>
-                <a:spcPts val="0"/>
-              </a:spcAft>
-              <a:buSzPts val="1800"/>
-              <a:buChar char="●"/>
-            </a:pPr>
-            <a:r>
-              <a:rPr lang="ro"/>
-              <a:t>CrossTalk, ZombieLoad and Co</a:t>
+              <a:t>demo: Raspberry PI 4B vs Orange Pi 5</a:t>
             </a:r>
             <a:endParaRPr/>
           </a:p>
@@ -8458,121 +9152,68 @@
             </a:pPr>
             <a:r>
               <a:rPr lang="ro"/>
-              <a:t>CrossTalk - Overview</a:t>
+              <a:t>Intel SHA-NI</a:t>
             </a:r>
             <a:endParaRPr/>
           </a:p>
         </p:txBody>
       </p:sp>
-      <p:sp>
-        <p:nvSpPr>
+      <p:pic>
+        <p:nvPicPr>
           <p:cNvPr id="105" name="Google Shape;105;p21"/>
-          <p:cNvSpPr txBox="1"/>
-          <p:nvPr>
-            <p:ph idx="1" type="body"/>
-          </p:nvPr>
-        </p:nvSpPr>
-        <p:spPr>
-          <a:xfrm>
-            <a:off x="311700" y="1152475"/>
-            <a:ext cx="8520600" cy="3416400"/>
+          <p:cNvPicPr preferRelativeResize="0"/>
+          <p:nvPr/>
+        </p:nvPicPr>
+        <p:blipFill>
+          <a:blip r:embed="rId3">
+            <a:alphaModFix/>
+          </a:blip>
+          <a:stretch>
+            <a:fillRect/>
+          </a:stretch>
+        </p:blipFill>
+        <p:spPr>
+          <a:xfrm>
+            <a:off x="1960150" y="1486638"/>
+            <a:ext cx="4285699" cy="2767850"/>
           </a:xfrm>
           <a:prstGeom prst="rect">
             <a:avLst/>
           </a:prstGeom>
-        </p:spPr>
-        <p:txBody>
-          <a:bodyPr anchorCtr="0" anchor="t" bIns="91425" lIns="91425" spcFirstLastPara="1" rIns="91425" wrap="square" tIns="91425">
-            <a:normAutofit/>
-          </a:bodyPr>
-          <a:lstStyle/>
-          <a:p>
-            <a:pPr indent="-342900" lvl="0" marL="457200" rtl="0" algn="l">
-              <a:spcBef>
-                <a:spcPts val="0"/>
-              </a:spcBef>
-              <a:spcAft>
-                <a:spcPts val="0"/>
-              </a:spcAft>
-              <a:buSzPts val="1800"/>
-              <a:buChar char="●"/>
-            </a:pPr>
-            <a:r>
-              <a:rPr lang="ro"/>
-              <a:t>cross-core staging buffer reading</a:t>
-            </a:r>
-            <a:endParaRPr/>
-          </a:p>
-          <a:p>
-            <a:pPr indent="-342900" lvl="0" marL="457200" rtl="0" algn="l">
-              <a:spcBef>
-                <a:spcPts val="0"/>
-              </a:spcBef>
-              <a:spcAft>
-                <a:spcPts val="0"/>
-              </a:spcAft>
-              <a:buSzPts val="1800"/>
-              <a:buChar char="●"/>
-            </a:pPr>
-            <a:r>
-              <a:rPr lang="ro"/>
-              <a:t>extremely hard to replicate</a:t>
-            </a:r>
-            <a:endParaRPr/>
-          </a:p>
-          <a:p>
-            <a:pPr indent="-342900" lvl="0" marL="457200" rtl="0" algn="l">
-              <a:spcBef>
-                <a:spcPts val="0"/>
-              </a:spcBef>
-              <a:spcAft>
-                <a:spcPts val="0"/>
-              </a:spcAft>
-              <a:buSzPts val="1800"/>
-              <a:buChar char="●"/>
-            </a:pPr>
-            <a:r>
-              <a:rPr lang="ro"/>
-              <a:t>not so destructive - you can read some random numbers from another core</a:t>
-            </a:r>
-            <a:endParaRPr/>
-          </a:p>
-          <a:p>
-            <a:pPr indent="-342900" lvl="0" marL="457200" rtl="0" algn="l">
-              <a:spcBef>
-                <a:spcPts val="0"/>
-              </a:spcBef>
-              <a:spcAft>
-                <a:spcPts val="0"/>
-              </a:spcAft>
-              <a:buSzPts val="1800"/>
-              <a:buChar char="●"/>
-            </a:pPr>
-            <a:r>
-              <a:rPr lang="ro"/>
-              <a:t>very bad for SGX enclaves</a:t>
-            </a:r>
-            <a:endParaRPr/>
-          </a:p>
-          <a:p>
-            <a:pPr indent="-342900" lvl="0" marL="457200" rtl="0" algn="l">
-              <a:spcBef>
-                <a:spcPts val="0"/>
-              </a:spcBef>
-              <a:spcAft>
-                <a:spcPts val="0"/>
-              </a:spcAft>
-              <a:buSzPts val="1800"/>
-              <a:buChar char="●"/>
-            </a:pPr>
-            <a:r>
-              <a:rPr lang="ro"/>
-              <a:t>mitigated by Intel</a:t>
-            </a:r>
-            <a:endParaRPr/>
-          </a:p>
-        </p:txBody>
-      </p:sp>
+          <a:noFill/>
+          <a:ln>
+            <a:noFill/>
+          </a:ln>
+        </p:spPr>
+      </p:pic>
+      <p:pic>
+        <p:nvPicPr>
+          <p:cNvPr id="106" name="Google Shape;106;p21"/>
+          <p:cNvPicPr preferRelativeResize="0"/>
+          <p:nvPr/>
+        </p:nvPicPr>
+        <p:blipFill>
+          <a:blip r:embed="rId4">
+            <a:alphaModFix/>
+          </a:blip>
+          <a:stretch>
+            <a:fillRect/>
+          </a:stretch>
+        </p:blipFill>
+        <p:spPr>
+          <a:xfrm>
+            <a:off x="3315250" y="2547025"/>
+            <a:ext cx="1100501" cy="1145752"/>
+          </a:xfrm>
+          <a:prstGeom prst="rect">
+            <a:avLst/>
+          </a:prstGeom>
+          <a:noFill/>
+          <a:ln>
+            <a:noFill/>
+          </a:ln>
+        </p:spPr>
+      </p:pic>
     </p:spTree>
   </p:cSld>
   <p:clrMapOvr>
@@ -8582,6 +9223,285 @@
 </file>
 
 <file path=ppt/theme/theme1.xml><?xml version="1.0" encoding="utf-8"?>
+<a:theme xmlns:a="http://schemas.openxmlformats.org/drawingml/2006/main" xmlns:r="http://schemas.openxmlformats.org/officeDocument/2006/relationships">
+  <a:themeElements>
+    <a:clrScheme name="Default">
+      <a:dk1>
+        <a:srgbClr val="000000"/>
+      </a:dk1>
+      <a:lt1>
+        <a:srgbClr val="FFFFFF"/>
+      </a:lt1>
+      <a:dk2>
+        <a:srgbClr val="158158"/>
+      </a:dk2>
+      <a:lt2>
+        <a:srgbClr val="F3F3F3"/>
+      </a:lt2>
+      <a:accent1>
+        <a:srgbClr val="058DC7"/>
+      </a:accent1>
+      <a:accent2>
+        <a:srgbClr val="50B432"/>
+      </a:accent2>
+      <a:accent3>
+        <a:srgbClr val="ED561B"/>
+      </a:accent3>
+      <a:accent4>
+        <a:srgbClr val="EDEF00"/>
+      </a:accent4>
+      <a:accent5>
+        <a:srgbClr val="24CBE5"/>
+      </a:accent5>
+      <a:accent6>
+        <a:srgbClr val="64E572"/>
+      </a:accent6>
+      <a:hlink>
+        <a:srgbClr val="2200CC"/>
+      </a:hlink>
+      <a:folHlink>
+        <a:srgbClr val="551A8B"/>
+      </a:folHlink>
+    </a:clrScheme>
+    <a:fontScheme name="Office">
+      <a:majorFont>
+        <a:latin typeface="Arial"/>
+        <a:ea typeface=""/>
+        <a:cs typeface=""/>
+        <a:font script="Jpan" typeface="ＭＳ Ｐゴシック"/>
+        <a:font script="Hang" typeface="맑은 고딕"/>
+        <a:font script="Hans" typeface="宋体"/>
+        <a:font script="Hant" typeface="新細明體"/>
+        <a:font script="Arab" typeface="Times New Roman"/>
+        <a:font script="Hebr" typeface="Times New Roman"/>
+        <a:font script="Thai" typeface="Angsana New"/>
+        <a:font script="Ethi" typeface="Nyala"/>
+        <a:font script="Beng" typeface="Vrinda"/>
+        <a:font script="Gujr" typeface="Shruti"/>
+        <a:font script="Khmr" typeface="MoolBoran"/>
+        <a:font script="Knda" typeface="Tunga"/>
+        <a:font script="Guru" typeface="Raavi"/>
+        <a:font script="Cans" typeface="Euphemia"/>
+        <a:font script="Cher" typeface="Plantagenet Cherokee"/>
+        <a:font script="Yiii" typeface="Microsoft Yi Baiti"/>
+        <a:font script="Tibt" typeface="Microsoft Himalaya"/>
+        <a:font script="Thaa" typeface="MV Boli"/>
+        <a:font script="Deva" typeface="Mangal"/>
+        <a:font script="Telu" typeface="Gautami"/>
+        <a:font script="Taml" typeface="Latha"/>
+        <a:font script="Syrc" typeface="Estrangelo Edessa"/>
+        <a:font script="Orya" typeface="Kalinga"/>
+        <a:font script="Mlym" typeface="Kartika"/>
+        <a:font script="Laoo" typeface="DokChampa"/>
+        <a:font script="Sinh" typeface="Iskoola Pota"/>
+        <a:font script="Mong" typeface="Mongolian Baiti"/>
+        <a:font script="Viet" typeface="Times New Roman"/>
+        <a:font script="Uigh" typeface="Microsoft Uighur"/>
+        <a:font script="Geor" typeface="Sylfaen"/>
+      </a:majorFont>
+      <a:minorFont>
+        <a:latin typeface="Arial"/>
+        <a:ea typeface=""/>
+        <a:cs typeface=""/>
+        <a:font script="Jpan" typeface="ＭＳ Ｐゴシック"/>
+        <a:font script="Hang" typeface="맑은 고딕"/>
+        <a:font script="Hans" typeface="宋体"/>
+        <a:font script="Hant" typeface="新細明體"/>
+        <a:font script="Arab" typeface="Arial"/>
+        <a:font script="Hebr" typeface="Arial"/>
+        <a:font script="Thai" typeface="Cordia New"/>
+        <a:font script="Ethi" typeface="Nyala"/>
+        <a:font script="Beng" typeface="Vrinda"/>
+        <a:font script="Gujr" typeface="Shruti"/>
+        <a:font script="Khmr" typeface="DaunPenh"/>
+        <a:font script="Knda" typeface="Tunga"/>
+        <a:font script="Guru" typeface="Raavi"/>
+        <a:font script="Cans" typeface="Euphemia"/>
+        <a:font script="Cher" typeface="Plantagenet Cherokee"/>
+        <a:font script="Yiii" typeface="Microsoft Yi Baiti"/>
+        <a:font script="Tibt" typeface="Microsoft Himalaya"/>
+        <a:font script="Thaa" typeface="MV Boli"/>
+        <a:font script="Deva" typeface="Mangal"/>
+        <a:font script="Telu" typeface="Gautami"/>
+        <a:font script="Taml" typeface="Latha"/>
+        <a:font script="Syrc" typeface="Estrangelo Edessa"/>
+        <a:font script="Orya" typeface="Kalinga"/>
+        <a:font script="Mlym" typeface="Kartika"/>
+        <a:font script="Laoo" typeface="DokChampa"/>
+        <a:font script="Sinh" typeface="Iskoola Pota"/>
+        <a:font script="Mong" typeface="Mongolian Baiti"/>
+        <a:font script="Viet" typeface="Arial"/>
+        <a:font script="Uigh" typeface="Microsoft Uighur"/>
+        <a:font script="Geor" typeface="Sylfaen"/>
+      </a:minorFont>
+    </a:fontScheme>
+    <a:fmtScheme name="Office">
+      <a:fillStyleLst>
+        <a:solidFill>
+          <a:schemeClr val="phClr"/>
+        </a:solidFill>
+        <a:gradFill rotWithShape="1">
+          <a:gsLst>
+            <a:gs pos="0">
+              <a:schemeClr val="phClr">
+                <a:tint val="50000"/>
+                <a:satMod val="300000"/>
+              </a:schemeClr>
+            </a:gs>
+            <a:gs pos="35000">
+              <a:schemeClr val="phClr">
+                <a:tint val="37000"/>
+                <a:satMod val="300000"/>
+              </a:schemeClr>
+            </a:gs>
+            <a:gs pos="100000">
+              <a:schemeClr val="phClr">
+                <a:tint val="15000"/>
+                <a:satMod val="350000"/>
+              </a:schemeClr>
+            </a:gs>
+          </a:gsLst>
+          <a:lin ang="16200000" scaled="1"/>
+        </a:gradFill>
+        <a:gradFill rotWithShape="1">
+          <a:gsLst>
+            <a:gs pos="0">
+              <a:schemeClr val="phClr">
+                <a:tint val="100000"/>
+                <a:shade val="100000"/>
+                <a:satMod val="130000"/>
+              </a:schemeClr>
+            </a:gs>
+            <a:gs pos="100000">
+              <a:schemeClr val="phClr">
+                <a:tint val="50000"/>
+                <a:shade val="100000"/>
+                <a:satMod val="350000"/>
+              </a:schemeClr>
+            </a:gs>
+          </a:gsLst>
+          <a:lin ang="16200000" scaled="0"/>
+        </a:gradFill>
+      </a:fillStyleLst>
+      <a:lnStyleLst>
+        <a:ln w="9525" cap="flat" cmpd="sng" algn="ctr">
+          <a:solidFill>
+            <a:schemeClr val="phClr">
+              <a:shade val="95000"/>
+              <a:satMod val="105000"/>
+            </a:schemeClr>
+          </a:solidFill>
+          <a:prstDash val="solid"/>
+        </a:ln>
+        <a:ln w="25400" cap="flat" cmpd="sng" algn="ctr">
+          <a:solidFill>
+            <a:schemeClr val="phClr"/>
+          </a:solidFill>
+          <a:prstDash val="solid"/>
+        </a:ln>
+        <a:ln w="38100" cap="flat" cmpd="sng" algn="ctr">
+          <a:solidFill>
+            <a:schemeClr val="phClr"/>
+          </a:solidFill>
+          <a:prstDash val="solid"/>
+        </a:ln>
+      </a:lnStyleLst>
+      <a:effectStyleLst>
+        <a:effectStyle>
+          <a:effectLst>
+            <a:outerShdw blurRad="40000" dist="20000" dir="5400000" rotWithShape="0">
+              <a:srgbClr val="000000">
+                <a:alpha val="38000"/>
+              </a:srgbClr>
+            </a:outerShdw>
+          </a:effectLst>
+        </a:effectStyle>
+        <a:effectStyle>
+          <a:effectLst>
+            <a:outerShdw blurRad="40000" dist="23000" dir="5400000" rotWithShape="0">
+              <a:srgbClr val="000000">
+                <a:alpha val="35000"/>
+              </a:srgbClr>
+            </a:outerShdw>
+          </a:effectLst>
+        </a:effectStyle>
+        <a:effectStyle>
+          <a:effectLst>
+            <a:outerShdw blurRad="40000" dist="23000" dir="5400000" rotWithShape="0">
+              <a:srgbClr val="000000">
+                <a:alpha val="35000"/>
+              </a:srgbClr>
+            </a:outerShdw>
+          </a:effectLst>
+          <a:scene3d>
+            <a:camera prst="orthographicFront">
+              <a:rot lat="0" lon="0" rev="0"/>
+            </a:camera>
+            <a:lightRig rig="threePt" dir="t">
+              <a:rot lat="0" lon="0" rev="1200000"/>
+            </a:lightRig>
+          </a:scene3d>
+          <a:sp3d>
+            <a:bevelT w="63500" h="25400"/>
+          </a:sp3d>
+        </a:effectStyle>
+      </a:effectStyleLst>
+      <a:bgFillStyleLst>
+        <a:solidFill>
+          <a:schemeClr val="phClr"/>
+        </a:solidFill>
+        <a:gradFill rotWithShape="1">
+          <a:gsLst>
+            <a:gs pos="0">
+              <a:schemeClr val="phClr">
+                <a:tint val="40000"/>
+                <a:satMod val="350000"/>
+              </a:schemeClr>
+            </a:gs>
+            <a:gs pos="40000">
+              <a:schemeClr val="phClr">
+                <a:tint val="45000"/>
+                <a:shade val="99000"/>
+                <a:satMod val="350000"/>
+              </a:schemeClr>
+            </a:gs>
+            <a:gs pos="100000">
+              <a:schemeClr val="phClr">
+                <a:shade val="20000"/>
+                <a:satMod val="255000"/>
+              </a:schemeClr>
+            </a:gs>
+          </a:gsLst>
+          <a:path path="circle">
+            <a:fillToRect l="50000" t="-80000" r="50000" b="180000"/>
+          </a:path>
+        </a:gradFill>
+        <a:gradFill rotWithShape="1">
+          <a:gsLst>
+            <a:gs pos="0">
+              <a:schemeClr val="phClr">
+                <a:tint val="80000"/>
+                <a:satMod val="300000"/>
+              </a:schemeClr>
+            </a:gs>
+            <a:gs pos="100000">
+              <a:schemeClr val="phClr">
+                <a:shade val="30000"/>
+                <a:satMod val="200000"/>
+              </a:schemeClr>
+            </a:gs>
+          </a:gsLst>
+          <a:path path="circle">
+            <a:fillToRect l="50000" t="50000" r="50000" b="50000"/>
+          </a:path>
+        </a:gradFill>
+      </a:bgFillStyleLst>
+    </a:fmtScheme>
+  </a:themeElements>
+</a:theme>
+</file>
+
+<file path=ppt/theme/theme2.xml><?xml version="1.0" encoding="utf-8"?>
 <a:theme xmlns:a="http://schemas.openxmlformats.org/drawingml/2006/main" xmlns:r="http://schemas.openxmlformats.org/officeDocument/2006/relationships" name="Simple Light">
   <a:themeElements>
     <a:clrScheme name="Simple Light">
@@ -8858,283 +9778,4 @@
     </a:fmtScheme>
   </a:themeElements>
 </a:theme>
-</file>
-
-<file path=ppt/theme/theme2.xml><?xml version="1.0" encoding="utf-8"?>
-<a:theme xmlns:a="http://schemas.openxmlformats.org/drawingml/2006/main" xmlns:r="http://schemas.openxmlformats.org/officeDocument/2006/relationships">
-  <a:themeElements>
-    <a:clrScheme name="Default">
-      <a:dk1>
-        <a:srgbClr val="000000"/>
-      </a:dk1>
-      <a:lt1>
-        <a:srgbClr val="FFFFFF"/>
-      </a:lt1>
-      <a:dk2>
-        <a:srgbClr val="158158"/>
-      </a:dk2>
-      <a:lt2>
-        <a:srgbClr val="F3F3F3"/>
-      </a:lt2>
-      <a:accent1>
-        <a:srgbClr val="058DC7"/>
-      </a:accent1>
-      <a:accent2>
-        <a:srgbClr val="50B432"/>
-      </a:accent2>
-      <a:accent3>
-        <a:srgbClr val="ED561B"/>
-      </a:accent3>
-      <a:accent4>
-        <a:srgbClr val="EDEF00"/>
-      </a:accent4>
-      <a:accent5>
-        <a:srgbClr val="24CBE5"/>
-      </a:accent5>
-      <a:accent6>
-        <a:srgbClr val="64E572"/>
-      </a:accent6>
-      <a:hlink>
-        <a:srgbClr val="2200CC"/>
-      </a:hlink>
-      <a:folHlink>
-        <a:srgbClr val="551A8B"/>
-      </a:folHlink>
-    </a:clrScheme>
-    <a:fontScheme name="Office">
-      <a:majorFont>
-        <a:latin typeface="Arial"/>
-        <a:ea typeface=""/>
-        <a:cs typeface=""/>
-        <a:font script="Jpan" typeface="ＭＳ Ｐゴシック"/>
-        <a:font script="Hang" typeface="맑은 고딕"/>
-        <a:font script="Hans" typeface="宋体"/>
-        <a:font script="Hant" typeface="新細明體"/>
-        <a:font script="Arab" typeface="Times New Roman"/>
-        <a:font script="Hebr" typeface="Times New Roman"/>
-        <a:font script="Thai" typeface="Angsana New"/>
-        <a:font script="Ethi" typeface="Nyala"/>
-        <a:font script="Beng" typeface="Vrinda"/>
-        <a:font script="Gujr" typeface="Shruti"/>
-        <a:font script="Khmr" typeface="MoolBoran"/>
-        <a:font script="Knda" typeface="Tunga"/>
-        <a:font script="Guru" typeface="Raavi"/>
-        <a:font script="Cans" typeface="Euphemia"/>
-        <a:font script="Cher" typeface="Plantagenet Cherokee"/>
-        <a:font script="Yiii" typeface="Microsoft Yi Baiti"/>
-        <a:font script="Tibt" typeface="Microsoft Himalaya"/>
-        <a:font script="Thaa" typeface="MV Boli"/>
-        <a:font script="Deva" typeface="Mangal"/>
-        <a:font script="Telu" typeface="Gautami"/>
-        <a:font script="Taml" typeface="Latha"/>
-        <a:font script="Syrc" typeface="Estrangelo Edessa"/>
-        <a:font script="Orya" typeface="Kalinga"/>
-        <a:font script="Mlym" typeface="Kartika"/>
-        <a:font script="Laoo" typeface="DokChampa"/>
-        <a:font script="Sinh" typeface="Iskoola Pota"/>
-        <a:font script="Mong" typeface="Mongolian Baiti"/>
-        <a:font script="Viet" typeface="Times New Roman"/>
-        <a:font script="Uigh" typeface="Microsoft Uighur"/>
-        <a:font script="Geor" typeface="Sylfaen"/>
-      </a:majorFont>
-      <a:minorFont>
-        <a:latin typeface="Arial"/>
-        <a:ea typeface=""/>
-        <a:cs typeface=""/>
-        <a:font script="Jpan" typeface="ＭＳ Ｐゴシック"/>
-        <a:font script="Hang" typeface="맑은 고딕"/>
-        <a:font script="Hans" typeface="宋体"/>
-        <a:font script="Hant" typeface="新細明體"/>
-        <a:font script="Arab" typeface="Arial"/>
-        <a:font script="Hebr" typeface="Arial"/>
-        <a:font script="Thai" typeface="Cordia New"/>
-        <a:font script="Ethi" typeface="Nyala"/>
-        <a:font script="Beng" typeface="Vrinda"/>
-        <a:font script="Gujr" typeface="Shruti"/>
-        <a:font script="Khmr" typeface="DaunPenh"/>
-        <a:font script="Knda" typeface="Tunga"/>
-        <a:font script="Guru" typeface="Raavi"/>
-        <a:font script="Cans" typeface="Euphemia"/>
-        <a:font script="Cher" typeface="Plantagenet Cherokee"/>
-        <a:font script="Yiii" typeface="Microsoft Yi Baiti"/>
-        <a:font script="Tibt" typeface="Microsoft Himalaya"/>
-        <a:font script="Thaa" typeface="MV Boli"/>
-        <a:font script="Deva" typeface="Mangal"/>
-        <a:font script="Telu" typeface="Gautami"/>
-        <a:font script="Taml" typeface="Latha"/>
-        <a:font script="Syrc" typeface="Estrangelo Edessa"/>
-        <a:font script="Orya" typeface="Kalinga"/>
-        <a:font script="Mlym" typeface="Kartika"/>
-        <a:font script="Laoo" typeface="DokChampa"/>
-        <a:font script="Sinh" typeface="Iskoola Pota"/>
-        <a:font script="Mong" typeface="Mongolian Baiti"/>
-        <a:font script="Viet" typeface="Arial"/>
-        <a:font script="Uigh" typeface="Microsoft Uighur"/>
-        <a:font script="Geor" typeface="Sylfaen"/>
-      </a:minorFont>
-    </a:fontScheme>
-    <a:fmtScheme name="Office">
-      <a:fillStyleLst>
-        <a:solidFill>
-          <a:schemeClr val="phClr"/>
-        </a:solidFill>
-        <a:gradFill rotWithShape="1">
-          <a:gsLst>
-            <a:gs pos="0">
-              <a:schemeClr val="phClr">
-                <a:tint val="50000"/>
-                <a:satMod val="300000"/>
-              </a:schemeClr>
-            </a:gs>
-            <a:gs pos="35000">
-              <a:schemeClr val="phClr">
-                <a:tint val="37000"/>
-                <a:satMod val="300000"/>
-              </a:schemeClr>
-            </a:gs>
-            <a:gs pos="100000">
-              <a:schemeClr val="phClr">
-                <a:tint val="15000"/>
-                <a:satMod val="350000"/>
-              </a:schemeClr>
-            </a:gs>
-          </a:gsLst>
-          <a:lin ang="16200000" scaled="1"/>
-        </a:gradFill>
-        <a:gradFill rotWithShape="1">
-          <a:gsLst>
-            <a:gs pos="0">
-              <a:schemeClr val="phClr">
-                <a:tint val="100000"/>
-                <a:shade val="100000"/>
-                <a:satMod val="130000"/>
-              </a:schemeClr>
-            </a:gs>
-            <a:gs pos="100000">
-              <a:schemeClr val="phClr">
-                <a:tint val="50000"/>
-                <a:shade val="100000"/>
-                <a:satMod val="350000"/>
-              </a:schemeClr>
-            </a:gs>
-          </a:gsLst>
-          <a:lin ang="16200000" scaled="0"/>
-        </a:gradFill>
-      </a:fillStyleLst>
-      <a:lnStyleLst>
-        <a:ln w="9525" cap="flat" cmpd="sng" algn="ctr">
-          <a:solidFill>
-            <a:schemeClr val="phClr">
-              <a:shade val="95000"/>
-              <a:satMod val="105000"/>
-            </a:schemeClr>
-          </a:solidFill>
-          <a:prstDash val="solid"/>
-        </a:ln>
-        <a:ln w="25400" cap="flat" cmpd="sng" algn="ctr">
-          <a:solidFill>
-            <a:schemeClr val="phClr"/>
-          </a:solidFill>
-          <a:prstDash val="solid"/>
-        </a:ln>
-        <a:ln w="38100" cap="flat" cmpd="sng" algn="ctr">
-          <a:solidFill>
-            <a:schemeClr val="phClr"/>
-          </a:solidFill>
-          <a:prstDash val="solid"/>
-        </a:ln>
-      </a:lnStyleLst>
-      <a:effectStyleLst>
-        <a:effectStyle>
-          <a:effectLst>
-            <a:outerShdw blurRad="40000" dist="20000" dir="5400000" rotWithShape="0">
-              <a:srgbClr val="000000">
-                <a:alpha val="38000"/>
-              </a:srgbClr>
-            </a:outerShdw>
-          </a:effectLst>
-        </a:effectStyle>
-        <a:effectStyle>
-          <a:effectLst>
-            <a:outerShdw blurRad="40000" dist="23000" dir="5400000" rotWithShape="0">
-              <a:srgbClr val="000000">
-                <a:alpha val="35000"/>
-              </a:srgbClr>
-            </a:outerShdw>
-          </a:effectLst>
-        </a:effectStyle>
-        <a:effectStyle>
-          <a:effectLst>
-            <a:outerShdw blurRad="40000" dist="23000" dir="5400000" rotWithShape="0">
-              <a:srgbClr val="000000">
-                <a:alpha val="35000"/>
-              </a:srgbClr>
-            </a:outerShdw>
-          </a:effectLst>
-          <a:scene3d>
-            <a:camera prst="orthographicFront">
-              <a:rot lat="0" lon="0" rev="0"/>
-            </a:camera>
-            <a:lightRig rig="threePt" dir="t">
-              <a:rot lat="0" lon="0" rev="1200000"/>
-            </a:lightRig>
-          </a:scene3d>
-          <a:sp3d>
-            <a:bevelT w="63500" h="25400"/>
-          </a:sp3d>
-        </a:effectStyle>
-      </a:effectStyleLst>
-      <a:bgFillStyleLst>
-        <a:solidFill>
-          <a:schemeClr val="phClr"/>
-        </a:solidFill>
-        <a:gradFill rotWithShape="1">
-          <a:gsLst>
-            <a:gs pos="0">
-              <a:schemeClr val="phClr">
-                <a:tint val="40000"/>
-                <a:satMod val="350000"/>
-              </a:schemeClr>
-            </a:gs>
-            <a:gs pos="40000">
-              <a:schemeClr val="phClr">
-                <a:tint val="45000"/>
-                <a:shade val="99000"/>
-                <a:satMod val="350000"/>
-              </a:schemeClr>
-            </a:gs>
-            <a:gs pos="100000">
-              <a:schemeClr val="phClr">
-                <a:shade val="20000"/>
-                <a:satMod val="255000"/>
-              </a:schemeClr>
-            </a:gs>
-          </a:gsLst>
-          <a:path path="circle">
-            <a:fillToRect l="50000" t="-80000" r="50000" b="180000"/>
-          </a:path>
-        </a:gradFill>
-        <a:gradFill rotWithShape="1">
-          <a:gsLst>
-            <a:gs pos="0">
-              <a:schemeClr val="phClr">
-                <a:tint val="80000"/>
-                <a:satMod val="300000"/>
-              </a:schemeClr>
-            </a:gs>
-            <a:gs pos="100000">
-              <a:schemeClr val="phClr">
-                <a:shade val="30000"/>
-                <a:satMod val="200000"/>
-              </a:schemeClr>
-            </a:gs>
-          </a:gsLst>
-          <a:path path="circle">
-            <a:fillToRect l="50000" t="50000" r="50000" b="50000"/>
-          </a:path>
-        </a:gradFill>
-      </a:bgFillStyleLst>
-    </a:fmtScheme>
-  </a:themeElements>
-</a:theme>
 </file>
</xml_diff>